<commit_message>
consumption instead of consuption
</commit_message>
<xml_diff>
--- a/Materiale Extra/Use Case Diagram.pptx
+++ b/Materiale Extra/Use Case Diagram.pptx
@@ -12173,6 +12173,268 @@
           <a:chExt cx="0" cy="0"/>
         </a:xfrm>
       </p:grpSpPr>
+      <p:sp>
+        <p:nvSpPr>
+          <p:cNvPr id="2" name="TextBox 1">
+            <a:extLst>
+              <a:ext uri="{FF2B5EF4-FFF2-40B4-BE49-F238E27FC236}">
+                <a16:creationId xmlns:a16="http://schemas.microsoft.com/office/drawing/2014/main" id="{464AC640-C85B-D067-7738-4372274FF3B2}"/>
+              </a:ext>
+            </a:extLst>
+          </p:cNvPr>
+          <p:cNvSpPr txBox="1"/>
+          <p:nvPr/>
+        </p:nvSpPr>
+        <p:spPr>
+          <a:xfrm>
+            <a:off x="466531" y="1847461"/>
+            <a:ext cx="2425959" cy="369332"/>
+          </a:xfrm>
+          <a:prstGeom prst="rect">
+            <a:avLst/>
+          </a:prstGeom>
+          <a:noFill/>
+          <a:ln>
+            <a:solidFill>
+              <a:schemeClr val="bg2">
+                <a:lumMod val="25000"/>
+              </a:schemeClr>
+            </a:solidFill>
+          </a:ln>
+        </p:spPr>
+        <p:txBody>
+          <a:bodyPr wrap="square" rtlCol="0">
+            <a:spAutoFit/>
+          </a:bodyPr>
+          <a:lstStyle/>
+          <a:p>
+            <a:r>
+              <a:rPr lang="it-IT" dirty="0" err="1"/>
+              <a:t>Battery</a:t>
+            </a:r>
+            <a:r>
+              <a:rPr lang="it-IT" dirty="0"/>
+              <a:t> </a:t>
+            </a:r>
+            <a:r>
+              <a:rPr lang="it-IT" dirty="0" err="1"/>
+              <a:t>Capacity</a:t>
+            </a:r>
+            <a:r>
+              <a:rPr lang="it-IT" dirty="0"/>
+              <a:t> (KWh)</a:t>
+            </a:r>
+          </a:p>
+        </p:txBody>
+      </p:sp>
+      <p:sp>
+        <p:nvSpPr>
+          <p:cNvPr id="3" name="TextBox 2">
+            <a:extLst>
+              <a:ext uri="{FF2B5EF4-FFF2-40B4-BE49-F238E27FC236}">
+                <a16:creationId xmlns:a16="http://schemas.microsoft.com/office/drawing/2014/main" id="{A42EADD2-8616-E13E-51C3-E55B80A538C7}"/>
+              </a:ext>
+            </a:extLst>
+          </p:cNvPr>
+          <p:cNvSpPr txBox="1"/>
+          <p:nvPr/>
+        </p:nvSpPr>
+        <p:spPr>
+          <a:xfrm>
+            <a:off x="3791338" y="1816564"/>
+            <a:ext cx="3234613" cy="369332"/>
+          </a:xfrm>
+          <a:prstGeom prst="rect">
+            <a:avLst/>
+          </a:prstGeom>
+          <a:noFill/>
+          <a:ln>
+            <a:solidFill>
+              <a:schemeClr val="tx1"/>
+            </a:solidFill>
+          </a:ln>
+        </p:spPr>
+        <p:txBody>
+          <a:bodyPr wrap="square" rtlCol="0">
+            <a:spAutoFit/>
+          </a:bodyPr>
+          <a:lstStyle/>
+          <a:p>
+            <a:r>
+              <a:rPr lang="it-IT" dirty="0" err="1"/>
+              <a:t>Battery</a:t>
+            </a:r>
+            <a:r>
+              <a:rPr lang="it-IT" dirty="0"/>
+              <a:t> </a:t>
+            </a:r>
+            <a:r>
+              <a:rPr lang="it-IT" dirty="0" err="1"/>
+              <a:t>Consumption</a:t>
+            </a:r>
+            <a:r>
+              <a:rPr lang="it-IT" dirty="0"/>
+              <a:t> (km/KWh)</a:t>
+            </a:r>
+          </a:p>
+        </p:txBody>
+      </p:sp>
+      <p:cxnSp>
+        <p:nvCxnSpPr>
+          <p:cNvPr id="5" name="Connector: Elbow 4">
+            <a:extLst>
+              <a:ext uri="{FF2B5EF4-FFF2-40B4-BE49-F238E27FC236}">
+                <a16:creationId xmlns:a16="http://schemas.microsoft.com/office/drawing/2014/main" id="{C881CA23-9814-F44F-F5CD-107EFF1368DF}"/>
+              </a:ext>
+            </a:extLst>
+          </p:cNvPr>
+          <p:cNvCxnSpPr>
+            <a:cxnSpLocks/>
+            <a:stCxn id="2" idx="2"/>
+            <a:endCxn id="6" idx="1"/>
+          </p:cNvCxnSpPr>
+          <p:nvPr/>
+        </p:nvCxnSpPr>
+        <p:spPr>
+          <a:xfrm rot="16200000" flipH="1">
+            <a:off x="1665801" y="2230502"/>
+            <a:ext cx="750542" cy="723123"/>
+          </a:xfrm>
+          <a:prstGeom prst="bentConnector2">
+            <a:avLst/>
+          </a:prstGeom>
+          <a:ln>
+            <a:solidFill>
+              <a:schemeClr val="tx1"/>
+            </a:solidFill>
+            <a:tailEnd type="triangle"/>
+          </a:ln>
+        </p:spPr>
+        <p:style>
+          <a:lnRef idx="1">
+            <a:schemeClr val="accent1"/>
+          </a:lnRef>
+          <a:fillRef idx="0">
+            <a:schemeClr val="accent1"/>
+          </a:fillRef>
+          <a:effectRef idx="0">
+            <a:schemeClr val="accent1"/>
+          </a:effectRef>
+          <a:fontRef idx="minor">
+            <a:schemeClr val="tx1"/>
+          </a:fontRef>
+        </p:style>
+      </p:cxnSp>
+      <p:sp>
+        <p:nvSpPr>
+          <p:cNvPr id="6" name="TextBox 5">
+            <a:extLst>
+              <a:ext uri="{FF2B5EF4-FFF2-40B4-BE49-F238E27FC236}">
+                <a16:creationId xmlns:a16="http://schemas.microsoft.com/office/drawing/2014/main" id="{5C9F25AE-8D17-2B46-B33F-D44C7C94CDDC}"/>
+              </a:ext>
+            </a:extLst>
+          </p:cNvPr>
+          <p:cNvSpPr txBox="1"/>
+          <p:nvPr/>
+        </p:nvSpPr>
+        <p:spPr>
+          <a:xfrm>
+            <a:off x="2402634" y="2505670"/>
+            <a:ext cx="2341984" cy="923330"/>
+          </a:xfrm>
+          <a:prstGeom prst="rect">
+            <a:avLst/>
+          </a:prstGeom>
+          <a:noFill/>
+          <a:ln>
+            <a:solidFill>
+              <a:schemeClr val="tx1"/>
+            </a:solidFill>
+          </a:ln>
+        </p:spPr>
+        <p:txBody>
+          <a:bodyPr wrap="square" rtlCol="0">
+            <a:spAutoFit/>
+          </a:bodyPr>
+          <a:lstStyle/>
+          <a:p>
+            <a:r>
+              <a:rPr lang="it-IT" dirty="0" err="1"/>
+              <a:t>Autonomy</a:t>
+            </a:r>
+            <a:r>
+              <a:rPr lang="it-IT" dirty="0"/>
+              <a:t> of the </a:t>
+            </a:r>
+            <a:r>
+              <a:rPr lang="it-IT" dirty="0" err="1"/>
+              <a:t>electric</a:t>
+            </a:r>
+            <a:r>
+              <a:rPr lang="it-IT" dirty="0"/>
+              <a:t> </a:t>
+            </a:r>
+            <a:r>
+              <a:rPr lang="it-IT" dirty="0" err="1"/>
+              <a:t>vehicle</a:t>
+            </a:r>
+            <a:r>
+              <a:rPr lang="it-IT" dirty="0"/>
+              <a:t> with 100 % of </a:t>
+            </a:r>
+            <a:r>
+              <a:rPr lang="it-IT" dirty="0" err="1"/>
+              <a:t>battery</a:t>
+            </a:r>
+            <a:r>
+              <a:rPr lang="it-IT"/>
+              <a:t> (km)</a:t>
+            </a:r>
+          </a:p>
+        </p:txBody>
+      </p:sp>
+      <p:cxnSp>
+        <p:nvCxnSpPr>
+          <p:cNvPr id="9" name="Connector: Elbow 8">
+            <a:extLst>
+              <a:ext uri="{FF2B5EF4-FFF2-40B4-BE49-F238E27FC236}">
+                <a16:creationId xmlns:a16="http://schemas.microsoft.com/office/drawing/2014/main" id="{23B45D4D-7C2E-9E2B-662A-2FF18073757E}"/>
+              </a:ext>
+            </a:extLst>
+          </p:cNvPr>
+          <p:cNvCxnSpPr>
+            <a:stCxn id="3" idx="2"/>
+            <a:endCxn id="6" idx="3"/>
+          </p:cNvCxnSpPr>
+          <p:nvPr/>
+        </p:nvCxnSpPr>
+        <p:spPr>
+          <a:xfrm rot="5400000">
+            <a:off x="4685913" y="2244602"/>
+            <a:ext cx="781439" cy="664027"/>
+          </a:xfrm>
+          <a:prstGeom prst="bentConnector2">
+            <a:avLst/>
+          </a:prstGeom>
+          <a:ln>
+            <a:tailEnd type="triangle"/>
+          </a:ln>
+        </p:spPr>
+        <p:style>
+          <a:lnRef idx="1">
+            <a:schemeClr val="dk1"/>
+          </a:lnRef>
+          <a:fillRef idx="0">
+            <a:schemeClr val="dk1"/>
+          </a:fillRef>
+          <a:effectRef idx="0">
+            <a:schemeClr val="dk1"/>
+          </a:effectRef>
+          <a:fontRef idx="minor">
+            <a:schemeClr val="tx1"/>
+          </a:fontRef>
+        </p:style>
+      </p:cxnSp>
     </p:spTree>
     <p:extLst>
       <p:ext uri="{BB962C8B-B14F-4D97-AF65-F5344CB8AC3E}">

</xml_diff>